<commit_message>
Notifications through Serial Monitor
</commit_message>
<xml_diff>
--- a/presentacion/OldRockers.pptx
+++ b/presentacion/OldRockers.pptx
@@ -245,7 +245,7 @@
           <a:p>
             <a:fld id="{EF58493F-FF5E-4131-A429-A7BCDA48F899}" type="datetimeFigureOut">
               <a:rPr lang="en-US" smtClean="0"/>
-              <a:t>7/11/2017</a:t>
+              <a:t>7/12/2017</a:t>
             </a:fld>
             <a:endParaRPr lang="en-US"/>
           </a:p>
@@ -413,7 +413,7 @@
           <a:p>
             <a:fld id="{EF58493F-FF5E-4131-A429-A7BCDA48F899}" type="datetimeFigureOut">
               <a:rPr lang="en-US" smtClean="0"/>
-              <a:t>7/11/2017</a:t>
+              <a:t>7/12/2017</a:t>
             </a:fld>
             <a:endParaRPr lang="en-US"/>
           </a:p>
@@ -591,7 +591,7 @@
           <a:p>
             <a:fld id="{EF58493F-FF5E-4131-A429-A7BCDA48F899}" type="datetimeFigureOut">
               <a:rPr lang="en-US" smtClean="0"/>
-              <a:t>7/11/2017</a:t>
+              <a:t>7/12/2017</a:t>
             </a:fld>
             <a:endParaRPr lang="en-US"/>
           </a:p>
@@ -759,7 +759,7 @@
           <a:p>
             <a:fld id="{EF58493F-FF5E-4131-A429-A7BCDA48F899}" type="datetimeFigureOut">
               <a:rPr lang="en-US" smtClean="0"/>
-              <a:t>7/11/2017</a:t>
+              <a:t>7/12/2017</a:t>
             </a:fld>
             <a:endParaRPr lang="en-US"/>
           </a:p>
@@ -1004,7 +1004,7 @@
           <a:p>
             <a:fld id="{EF58493F-FF5E-4131-A429-A7BCDA48F899}" type="datetimeFigureOut">
               <a:rPr lang="en-US" smtClean="0"/>
-              <a:t>7/11/2017</a:t>
+              <a:t>7/12/2017</a:t>
             </a:fld>
             <a:endParaRPr lang="en-US"/>
           </a:p>
@@ -1233,7 +1233,7 @@
           <a:p>
             <a:fld id="{EF58493F-FF5E-4131-A429-A7BCDA48F899}" type="datetimeFigureOut">
               <a:rPr lang="en-US" smtClean="0"/>
-              <a:t>7/11/2017</a:t>
+              <a:t>7/12/2017</a:t>
             </a:fld>
             <a:endParaRPr lang="en-US"/>
           </a:p>
@@ -1597,7 +1597,7 @@
           <a:p>
             <a:fld id="{EF58493F-FF5E-4131-A429-A7BCDA48F899}" type="datetimeFigureOut">
               <a:rPr lang="en-US" smtClean="0"/>
-              <a:t>7/11/2017</a:t>
+              <a:t>7/12/2017</a:t>
             </a:fld>
             <a:endParaRPr lang="en-US"/>
           </a:p>
@@ -1714,7 +1714,7 @@
           <a:p>
             <a:fld id="{EF58493F-FF5E-4131-A429-A7BCDA48F899}" type="datetimeFigureOut">
               <a:rPr lang="en-US" smtClean="0"/>
-              <a:t>7/11/2017</a:t>
+              <a:t>7/12/2017</a:t>
             </a:fld>
             <a:endParaRPr lang="en-US"/>
           </a:p>
@@ -1809,7 +1809,7 @@
           <a:p>
             <a:fld id="{EF58493F-FF5E-4131-A429-A7BCDA48F899}" type="datetimeFigureOut">
               <a:rPr lang="en-US" smtClean="0"/>
-              <a:t>7/11/2017</a:t>
+              <a:t>7/12/2017</a:t>
             </a:fld>
             <a:endParaRPr lang="en-US"/>
           </a:p>
@@ -2084,7 +2084,7 @@
           <a:p>
             <a:fld id="{EF58493F-FF5E-4131-A429-A7BCDA48F899}" type="datetimeFigureOut">
               <a:rPr lang="en-US" smtClean="0"/>
-              <a:t>7/11/2017</a:t>
+              <a:t>7/12/2017</a:t>
             </a:fld>
             <a:endParaRPr lang="en-US"/>
           </a:p>
@@ -2336,7 +2336,7 @@
           <a:p>
             <a:fld id="{EF58493F-FF5E-4131-A429-A7BCDA48F899}" type="datetimeFigureOut">
               <a:rPr lang="en-US" smtClean="0"/>
-              <a:t>7/11/2017</a:t>
+              <a:t>7/12/2017</a:t>
             </a:fld>
             <a:endParaRPr lang="en-US"/>
           </a:p>
@@ -2547,7 +2547,7 @@
           <a:p>
             <a:fld id="{EF58493F-FF5E-4131-A429-A7BCDA48F899}" type="datetimeFigureOut">
               <a:rPr lang="en-US" smtClean="0"/>
-              <a:t>7/11/2017</a:t>
+              <a:t>7/12/2017</a:t>
             </a:fld>
             <a:endParaRPr lang="en-US"/>
           </a:p>
@@ -2954,128 +2954,6 @@
       </p:grpSpPr>
       <p:sp>
         <p:nvSpPr>
-          <p:cNvPr id="53" name="Rectangle: Rounded Corners 52"/>
-          <p:cNvSpPr/>
-          <p:nvPr/>
-        </p:nvSpPr>
-        <p:spPr>
-          <a:xfrm>
-            <a:off x="6070977" y="4455091"/>
-            <a:ext cx="6022462" cy="2354783"/>
-          </a:xfrm>
-          <a:prstGeom prst="roundRect">
-            <a:avLst>
-              <a:gd name="adj" fmla="val 7701"/>
-            </a:avLst>
-          </a:prstGeom>
-          <a:solidFill>
-            <a:schemeClr val="accent1">
-              <a:lumMod val="20000"/>
-              <a:lumOff val="80000"/>
-            </a:schemeClr>
-          </a:solidFill>
-          <a:ln>
-            <a:noFill/>
-          </a:ln>
-        </p:spPr>
-        <p:style>
-          <a:lnRef idx="2">
-            <a:schemeClr val="accent1">
-              <a:shade val="50000"/>
-            </a:schemeClr>
-          </a:lnRef>
-          <a:fillRef idx="1">
-            <a:schemeClr val="accent1"/>
-          </a:fillRef>
-          <a:effectRef idx="0">
-            <a:schemeClr val="accent1"/>
-          </a:effectRef>
-          <a:fontRef idx="minor">
-            <a:schemeClr val="lt1"/>
-          </a:fontRef>
-        </p:style>
-        <p:txBody>
-          <a:bodyPr rtlCol="0" anchor="ctr"/>
-          <a:lstStyle/>
-          <a:p>
-            <a:r>
-              <a:rPr lang="en-US" sz="2400" b="1" u="sng" dirty="0">
-                <a:solidFill>
-                  <a:srgbClr val="0070C0"/>
-                </a:solidFill>
-              </a:rPr>
-              <a:t>Use Cases</a:t>
-            </a:r>
-          </a:p>
-          <a:p>
-            <a:pPr marL="342900" indent="-342900">
-              <a:buAutoNum type="arabicPeriod"/>
-            </a:pPr>
-            <a:r>
-              <a:rPr lang="en-US" sz="2000" dirty="0">
-                <a:solidFill>
-                  <a:srgbClr val="0070C0"/>
-                </a:solidFill>
-              </a:rPr>
-              <a:t>Remote system activation/de-activation</a:t>
-            </a:r>
-          </a:p>
-          <a:p>
-            <a:pPr marL="342900" indent="-342900">
-              <a:buAutoNum type="arabicPeriod"/>
-            </a:pPr>
-            <a:r>
-              <a:rPr lang="en-US" sz="2000" dirty="0">
-                <a:solidFill>
-                  <a:srgbClr val="0070C0"/>
-                </a:solidFill>
-              </a:rPr>
-              <a:t>General case: Watering at scheduled times</a:t>
-            </a:r>
-          </a:p>
-          <a:p>
-            <a:pPr marL="800100" lvl="1" indent="-342900">
-              <a:buAutoNum type="arabicPeriod"/>
-            </a:pPr>
-            <a:r>
-              <a:rPr lang="en-US" sz="2000" dirty="0">
-                <a:solidFill>
-                  <a:srgbClr val="0070C0"/>
-                </a:solidFill>
-              </a:rPr>
-              <a:t>Check humidity before watering + Notification</a:t>
-            </a:r>
-          </a:p>
-          <a:p>
-            <a:pPr marL="800100" lvl="1" indent="-342900">
-              <a:buAutoNum type="arabicPeriod"/>
-            </a:pPr>
-            <a:r>
-              <a:rPr lang="en-US" sz="2000" dirty="0">
-                <a:solidFill>
-                  <a:srgbClr val="0070C0"/>
-                </a:solidFill>
-              </a:rPr>
-              <a:t>Stop watering when reaching humidity + Notification</a:t>
-            </a:r>
-          </a:p>
-          <a:p>
-            <a:pPr marL="342900" indent="-342900">
-              <a:buAutoNum type="arabicPeriod"/>
-            </a:pPr>
-            <a:r>
-              <a:rPr lang="en-US" sz="2000" dirty="0">
-                <a:solidFill>
-                  <a:srgbClr val="0070C0"/>
-                </a:solidFill>
-              </a:rPr>
-              <a:t>Manual (Remote) override – Under construction</a:t>
-            </a:r>
-          </a:p>
-        </p:txBody>
-      </p:sp>
-      <p:sp>
-        <p:nvSpPr>
           <p:cNvPr id="40" name="Oval 39"/>
           <p:cNvSpPr/>
           <p:nvPr/>
@@ -5395,7 +5273,7 @@
         </p:nvSpPr>
         <p:spPr>
           <a:xfrm>
-            <a:off x="3096193" y="4154804"/>
+            <a:off x="3071879" y="3595192"/>
             <a:ext cx="2797369" cy="2062103"/>
           </a:xfrm>
           <a:prstGeom prst="rect">
@@ -5751,6 +5629,128 @@
                 </a:solidFill>
               </a:rPr>
               <a:t>(in project)</a:t>
+            </a:r>
+          </a:p>
+        </p:txBody>
+      </p:sp>
+      <p:sp>
+        <p:nvSpPr>
+          <p:cNvPr id="53" name="Rectangle: Rounded Corners 52"/>
+          <p:cNvSpPr/>
+          <p:nvPr/>
+        </p:nvSpPr>
+        <p:spPr>
+          <a:xfrm>
+            <a:off x="5931911" y="4148231"/>
+            <a:ext cx="6161528" cy="2661643"/>
+          </a:xfrm>
+          <a:prstGeom prst="roundRect">
+            <a:avLst>
+              <a:gd name="adj" fmla="val 7701"/>
+            </a:avLst>
+          </a:prstGeom>
+          <a:solidFill>
+            <a:schemeClr val="accent1">
+              <a:lumMod val="20000"/>
+              <a:lumOff val="80000"/>
+            </a:schemeClr>
+          </a:solidFill>
+          <a:ln>
+            <a:noFill/>
+          </a:ln>
+        </p:spPr>
+        <p:style>
+          <a:lnRef idx="2">
+            <a:schemeClr val="accent1">
+              <a:shade val="50000"/>
+            </a:schemeClr>
+          </a:lnRef>
+          <a:fillRef idx="1">
+            <a:schemeClr val="accent1"/>
+          </a:fillRef>
+          <a:effectRef idx="0">
+            <a:schemeClr val="accent1"/>
+          </a:effectRef>
+          <a:fontRef idx="minor">
+            <a:schemeClr val="lt1"/>
+          </a:fontRef>
+        </p:style>
+        <p:txBody>
+          <a:bodyPr rtlCol="0" anchor="ctr"/>
+          <a:lstStyle/>
+          <a:p>
+            <a:r>
+              <a:rPr lang="en-US" sz="2400" b="1" u="sng" dirty="0">
+                <a:solidFill>
+                  <a:srgbClr val="0070C0"/>
+                </a:solidFill>
+              </a:rPr>
+              <a:t>Use Cases</a:t>
+            </a:r>
+          </a:p>
+          <a:p>
+            <a:pPr marL="342900" indent="-342900">
+              <a:buAutoNum type="arabicPeriod"/>
+            </a:pPr>
+            <a:r>
+              <a:rPr lang="en-US" sz="2000" dirty="0">
+                <a:solidFill>
+                  <a:srgbClr val="0070C0"/>
+                </a:solidFill>
+              </a:rPr>
+              <a:t>Remote system activation/de-activation</a:t>
+            </a:r>
+          </a:p>
+          <a:p>
+            <a:pPr marL="342900" indent="-342900">
+              <a:buAutoNum type="arabicPeriod"/>
+            </a:pPr>
+            <a:r>
+              <a:rPr lang="en-US" sz="2000" dirty="0">
+                <a:solidFill>
+                  <a:srgbClr val="0070C0"/>
+                </a:solidFill>
+              </a:rPr>
+              <a:t>General case: Watering at scheduled times</a:t>
+            </a:r>
+          </a:p>
+          <a:p>
+            <a:pPr marL="800100" lvl="1" indent="-342900">
+              <a:buAutoNum type="arabicPeriod"/>
+            </a:pPr>
+            <a:r>
+              <a:rPr lang="en-US" sz="2000" dirty="0">
+                <a:solidFill>
+                  <a:srgbClr val="0070C0"/>
+                </a:solidFill>
+              </a:rPr>
+              <a:t>Check humidity before watering + Notification (through Serial Monitor)</a:t>
+            </a:r>
+          </a:p>
+          <a:p>
+            <a:pPr marL="800100" lvl="1" indent="-342900">
+              <a:buAutoNum type="arabicPeriod"/>
+            </a:pPr>
+            <a:r>
+              <a:rPr lang="en-US" sz="2000" dirty="0">
+                <a:solidFill>
+                  <a:srgbClr val="0070C0"/>
+                </a:solidFill>
+              </a:rPr>
+              <a:t>Stop watering when reaching humidity + Notification (through Serial Monitor)</a:t>
+            </a:r>
+          </a:p>
+          <a:p>
+            <a:pPr marL="342900" indent="-342900">
+              <a:buAutoNum type="arabicPeriod"/>
+            </a:pPr>
+            <a:r>
+              <a:rPr lang="en-US" sz="2000" dirty="0">
+                <a:solidFill>
+                  <a:srgbClr val="0070C0"/>
+                </a:solidFill>
+              </a:rPr>
+              <a:t>Manual (Remote) override – Under construction</a:t>
             </a:r>
           </a:p>
         </p:txBody>

</xml_diff>